<commit_message>
Built site for crosstable: 0.2.2@74b20d3
</commit_message>
<xml_diff>
--- a/reference/figures/ct2.pptx
+++ b/reference/figures/ct2.pptx
@@ -3166,6 +3166,14 @@
             <a:avLst/>
           </a:prstGeom>
           <a:noFill/>
+          <a:ln>
+            <a:solidFill>
+              <a:schemeClr val="tx1">
+                <a:lumMod val="85000"/>
+                <a:lumOff val="15000"/>
+              </a:schemeClr>
+            </a:solidFill>
+          </a:ln>
         </p:spPr>
         <p:txBody>
           <a:bodyPr wrap="none" rtlCol="0">
@@ -3313,6 +3321,14 @@
             <a:avLst/>
           </a:prstGeom>
           <a:noFill/>
+          <a:ln>
+            <a:solidFill>
+              <a:schemeClr val="tx1">
+                <a:lumMod val="85000"/>
+                <a:lumOff val="15000"/>
+              </a:schemeClr>
+            </a:solidFill>
+          </a:ln>
         </p:spPr>
         <p:txBody>
           <a:bodyPr wrap="none" rtlCol="0">
@@ -3506,6 +3522,14 @@
             <a:avLst/>
           </a:prstGeom>
           <a:noFill/>
+          <a:ln>
+            <a:solidFill>
+              <a:schemeClr val="tx1">
+                <a:lumMod val="85000"/>
+                <a:lumOff val="15000"/>
+              </a:schemeClr>
+            </a:solidFill>
+          </a:ln>
         </p:spPr>
         <p:txBody>
           <a:bodyPr wrap="square" rtlCol="0">
@@ -3600,6 +3624,14 @@
             <a:avLst/>
           </a:prstGeom>
           <a:noFill/>
+          <a:ln>
+            <a:solidFill>
+              <a:schemeClr val="tx1">
+                <a:lumMod val="85000"/>
+                <a:lumOff val="15000"/>
+              </a:schemeClr>
+            </a:solidFill>
+          </a:ln>
         </p:spPr>
         <p:txBody>
           <a:bodyPr wrap="none" rtlCol="0">
@@ -3703,16 +3735,24 @@
         </p:nvSpPr>
         <p:spPr>
           <a:xfrm>
-            <a:off x="244081" y="6378189"/>
-            <a:ext cx="4237057" cy="369332"/>
+            <a:off x="95592" y="6305029"/>
+            <a:ext cx="4075528" cy="369332"/>
           </a:xfrm>
           <a:prstGeom prst="rect">
             <a:avLst/>
           </a:prstGeom>
           <a:noFill/>
+          <a:ln>
+            <a:solidFill>
+              <a:schemeClr val="tx1">
+                <a:lumMod val="85000"/>
+                <a:lumOff val="15000"/>
+              </a:schemeClr>
+            </a:solidFill>
+          </a:ln>
         </p:spPr>
         <p:txBody>
-          <a:bodyPr wrap="none" rtlCol="0">
+          <a:bodyPr wrap="square" rtlCol="0">
             <a:spAutoFit/>
           </a:bodyPr>
           <a:lstStyle/>
@@ -3853,6 +3893,14 @@
             <a:avLst/>
           </a:prstGeom>
           <a:noFill/>
+          <a:ln>
+            <a:solidFill>
+              <a:schemeClr val="tx1">
+                <a:lumMod val="85000"/>
+                <a:lumOff val="15000"/>
+              </a:schemeClr>
+            </a:solidFill>
+          </a:ln>
         </p:spPr>
         <p:txBody>
           <a:bodyPr wrap="none" rtlCol="0">
@@ -3924,8 +3972,8 @@
         </p:nvCxnSpPr>
         <p:spPr>
           <a:xfrm flipV="1">
-            <a:off x="4481138" y="6448088"/>
-            <a:ext cx="2004421" cy="114767"/>
+            <a:off x="4171120" y="6409019"/>
+            <a:ext cx="2286939" cy="80676"/>
           </a:xfrm>
           <a:prstGeom prst="straightConnector1">
             <a:avLst/>

</xml_diff>